<commit_message>
Added a slide on the fitting algorithms.
</commit_message>
<xml_diff>
--- a/Presentations/ISIS SCD Numerical Group/workshop_3Aug2015/Under the bonnet fitting.pptx
+++ b/Presentations/ISIS SCD Numerical Group/workshop_3Aug2015/Under the bonnet fitting.pptx
@@ -6,13 +6,14 @@
     <p:sldMasterId id="2147483894" r:id="rId2"/>
   </p:sldMasterIdLst>
   <p:notesMasterIdLst>
-    <p:notesMasterId r:id="rId4"/>
+    <p:notesMasterId r:id="rId5"/>
   </p:notesMasterIdLst>
   <p:handoutMasterIdLst>
-    <p:handoutMasterId r:id="rId5"/>
+    <p:handoutMasterId r:id="rId6"/>
   </p:handoutMasterIdLst>
   <p:sldIdLst>
     <p:sldId id="256" r:id="rId3"/>
+    <p:sldId id="257" r:id="rId4"/>
   </p:sldIdLst>
   <p:sldSz cx="9144000" cy="6858000" type="screen4x3"/>
   <p:notesSz cx="6794500" cy="9906000"/>
@@ -226,7 +227,7 @@
           <a:p>
             <a:fld id="{CA8B9203-037A-454E-A796-95EF4352A35F}" type="datetimeFigureOut">
               <a:rPr lang="en-GB" smtClean="0"/>
-              <a:t>31/07/2015</a:t>
+              <a:t>03/08/2015</a:t>
             </a:fld>
             <a:endParaRPr lang="en-GB"/>
           </a:p>
@@ -4653,6 +4654,162 @@
   <p:clrMapOvr>
     <a:masterClrMapping/>
   </p:clrMapOvr>
+  <p:timing>
+    <p:tnLst>
+      <p:par>
+        <p:cTn id="1" dur="indefinite" restart="never" nodeType="tmRoot"/>
+      </p:par>
+    </p:tnLst>
+  </p:timing>
+</p:sld>
+</file>
+
+<file path=ppt/slides/slide2.xml><?xml version="1.0" encoding="utf-8"?>
+<p:sld xmlns:a="http://schemas.openxmlformats.org/drawingml/2006/main" xmlns:r="http://schemas.openxmlformats.org/officeDocument/2006/relationships" xmlns:p="http://schemas.openxmlformats.org/presentationml/2006/main">
+  <p:cSld>
+    <p:spTree>
+      <p:nvGrpSpPr>
+        <p:cNvPr id="1" name=""/>
+        <p:cNvGrpSpPr/>
+        <p:nvPr/>
+      </p:nvGrpSpPr>
+      <p:grpSpPr>
+        <a:xfrm>
+          <a:off x="0" y="0"/>
+          <a:ext cx="0" cy="0"/>
+          <a:chOff x="0" y="0"/>
+          <a:chExt cx="0" cy="0"/>
+        </a:xfrm>
+      </p:grpSpPr>
+      <p:sp>
+        <p:nvSpPr>
+          <p:cNvPr id="2" name="TextBox 1"/>
+          <p:cNvSpPr txBox="1"/>
+          <p:nvPr/>
+        </p:nvSpPr>
+        <p:spPr>
+          <a:xfrm>
+            <a:off x="737827" y="671615"/>
+            <a:ext cx="7478329" cy="3170099"/>
+          </a:xfrm>
+          <a:prstGeom prst="rect">
+            <a:avLst/>
+          </a:prstGeom>
+          <a:noFill/>
+        </p:spPr>
+        <p:txBody>
+          <a:bodyPr wrap="none" rtlCol="0">
+            <a:spAutoFit/>
+          </a:bodyPr>
+          <a:lstStyle/>
+          <a:p>
+            <a:r>
+              <a:rPr lang="en-GB" sz="2000" dirty="0" smtClean="0"/>
+              <a:t>Fitting algorithms:</a:t>
+            </a:r>
+          </a:p>
+          <a:p>
+            <a:endParaRPr lang="en-GB" dirty="0"/>
+          </a:p>
+          <a:p>
+            <a:r>
+              <a:rPr lang="en-GB" dirty="0" smtClean="0"/>
+              <a:t>Fit – </a:t>
+            </a:r>
+            <a:r>
+              <a:rPr lang="en-GB" b="0" dirty="0" smtClean="0"/>
+              <a:t>fits functions to data.</a:t>
+            </a:r>
+          </a:p>
+          <a:p>
+            <a:endParaRPr lang="en-GB" b="0" dirty="0"/>
+          </a:p>
+          <a:p>
+            <a:r>
+              <a:rPr lang="en-GB" dirty="0" err="1" smtClean="0"/>
+              <a:t>EvaluateFunction</a:t>
+            </a:r>
+            <a:r>
+              <a:rPr lang="en-GB" dirty="0" smtClean="0"/>
+              <a:t> – </a:t>
+            </a:r>
+            <a:r>
+              <a:rPr lang="en-GB" b="0" dirty="0" smtClean="0"/>
+              <a:t>evaluates a function on a workspace.</a:t>
+            </a:r>
+          </a:p>
+          <a:p>
+            <a:endParaRPr lang="en-GB" b="0" dirty="0"/>
+          </a:p>
+          <a:p>
+            <a:r>
+              <a:rPr lang="en-GB" dirty="0" err="1" smtClean="0"/>
+              <a:t>PlotPeakByLogValue</a:t>
+            </a:r>
+            <a:r>
+              <a:rPr lang="en-GB" dirty="0"/>
+              <a:t> </a:t>
+            </a:r>
+            <a:r>
+              <a:rPr lang="en-GB" dirty="0" smtClean="0"/>
+              <a:t>– </a:t>
+            </a:r>
+            <a:r>
+              <a:rPr lang="en-GB" b="0" dirty="0" smtClean="0"/>
+              <a:t>fits multiple data sets sequentially.</a:t>
+            </a:r>
+          </a:p>
+          <a:p>
+            <a:endParaRPr lang="en-GB" b="0" dirty="0"/>
+          </a:p>
+          <a:p>
+            <a:r>
+              <a:rPr lang="en-GB" dirty="0" err="1" smtClean="0"/>
+              <a:t>CalculateChiSquared</a:t>
+            </a:r>
+            <a:r>
+              <a:rPr lang="en-GB" dirty="0" smtClean="0"/>
+              <a:t> – </a:t>
+            </a:r>
+            <a:r>
+              <a:rPr lang="en-GB" b="0" dirty="0" smtClean="0"/>
+              <a:t>calculates the chi squared for a function </a:t>
+            </a:r>
+            <a:br>
+              <a:rPr lang="en-GB" b="0" dirty="0" smtClean="0"/>
+            </a:br>
+            <a:r>
+              <a:rPr lang="en-GB" b="0" dirty="0" smtClean="0"/>
+              <a:t>and a data set, plots 1d slices of the chi squared and estimates</a:t>
+            </a:r>
+            <a:br>
+              <a:rPr lang="en-GB" b="0" dirty="0" smtClean="0"/>
+            </a:br>
+            <a:r>
+              <a:rPr lang="en-GB" b="0" dirty="0" smtClean="0"/>
+              <a:t>standard deviations of the parameters.</a:t>
+            </a:r>
+            <a:endParaRPr lang="en-GB" dirty="0"/>
+          </a:p>
+        </p:txBody>
+      </p:sp>
+    </p:spTree>
+    <p:extLst>
+      <p:ext uri="{BB962C8B-B14F-4D97-AF65-F5344CB8AC3E}">
+        <p14:creationId xmlns:p14="http://schemas.microsoft.com/office/powerpoint/2010/main" val="2110092755"/>
+      </p:ext>
+    </p:extLst>
+  </p:cSld>
+  <p:clrMapOvr>
+    <a:masterClrMapping/>
+  </p:clrMapOvr>
+  <p:timing>
+    <p:tnLst>
+      <p:par>
+        <p:cTn id="1" dur="indefinite" restart="never" nodeType="tmRoot"/>
+      </p:par>
+    </p:tnLst>
+  </p:timing>
 </p:sld>
 </file>
 

</xml_diff>